<commit_message>
Changes to cloud documentation.
</commit_message>
<xml_diff>
--- a/Documentation/Presentation.pptx
+++ b/Documentation/Presentation.pptx
@@ -249,7 +249,7 @@
           <a:p>
             <a:fld id="{80680FBE-A8DF-4758-9AC4-3A9E1039168F}" type="datetimeFigureOut">
               <a:rPr lang="en-US" smtClean="0"/>
-              <a:t>10/4/2020</a:t>
+              <a:t>10/5/2020</a:t>
             </a:fld>
             <a:endParaRPr lang="en-US"/>
           </a:p>
@@ -414,7 +414,7 @@
           <a:p>
             <a:fld id="{EC13577B-6902-467D-A26C-08A0DD5E4E03}" type="datetimeFigureOut">
               <a:rPr lang="en-US" smtClean="0"/>
-              <a:t>10/4/2020</a:t>
+              <a:t>10/5/2020</a:t>
             </a:fld>
             <a:endParaRPr lang="en-US"/>
           </a:p>
@@ -1209,7 +1209,7 @@
             <a:fld id="{8BEEBAAA-29B5-4AF5-BC5F-7E580C29002D}" type="datetimeFigureOut">
               <a:rPr lang="en-US" smtClean="0"/>
               <a:pPr/>
-              <a:t>10/4/2020</a:t>
+              <a:t>10/5/2020</a:t>
             </a:fld>
             <a:endParaRPr lang="en-US"/>
           </a:p>
@@ -1835,7 +1835,7 @@
             <a:fld id="{8BEEBAAA-29B5-4AF5-BC5F-7E580C29002D}" type="datetimeFigureOut">
               <a:rPr lang="en-US" smtClean="0"/>
               <a:pPr/>
-              <a:t>10/4/2020</a:t>
+              <a:t>10/5/2020</a:t>
             </a:fld>
             <a:endParaRPr lang="en-US"/>
           </a:p>
@@ -3287,6 +3287,53 @@
           </a:p>
         </p:txBody>
       </p:sp>
+      <p:pic>
+        <p:nvPicPr>
+          <p:cNvPr id="1026" name="Picture 2">
+            <a:extLst>
+              <a:ext uri="{FF2B5EF4-FFF2-40B4-BE49-F238E27FC236}">
+                <a16:creationId xmlns:a16="http://schemas.microsoft.com/office/drawing/2014/main" id="{FB9449D2-3804-49A0-A33D-E19F3E8F223B}"/>
+              </a:ext>
+            </a:extLst>
+          </p:cNvPr>
+          <p:cNvPicPr>
+            <a:picLocks noChangeAspect="1" noChangeArrowheads="1"/>
+          </p:cNvPicPr>
+          <p:nvPr/>
+        </p:nvPicPr>
+        <p:blipFill>
+          <a:blip r:embed="rId2">
+            <a:extLst>
+              <a:ext uri="{28A0092B-C50C-407E-A947-70E740481C1C}">
+                <a14:useLocalDpi xmlns:a14="http://schemas.microsoft.com/office/drawing/2010/main" val="0"/>
+              </a:ext>
+            </a:extLst>
+          </a:blip>
+          <a:srcRect/>
+          <a:stretch>
+            <a:fillRect/>
+          </a:stretch>
+        </p:blipFill>
+        <p:spPr bwMode="auto">
+          <a:xfrm>
+            <a:off x="5539230" y="1524708"/>
+            <a:ext cx="5991649" cy="3808584"/>
+          </a:xfrm>
+          <a:prstGeom prst="rect">
+            <a:avLst/>
+          </a:prstGeom>
+          <a:noFill/>
+          <a:extLst>
+            <a:ext uri="{909E8E84-426E-40DD-AFC4-6F175D3DCCD1}">
+              <a14:hiddenFill xmlns:a14="http://schemas.microsoft.com/office/drawing/2010/main">
+                <a:solidFill>
+                  <a:srgbClr val="FFFFFF"/>
+                </a:solidFill>
+              </a14:hiddenFill>
+            </a:ext>
+          </a:extLst>
+        </p:spPr>
+      </p:pic>
     </p:spTree>
     <p:extLst>
       <p:ext uri="{BB962C8B-B14F-4D97-AF65-F5344CB8AC3E}">
@@ -3657,6 +3704,64 @@
           </a:p>
         </p:txBody>
       </p:sp>
+      <p:pic>
+        <p:nvPicPr>
+          <p:cNvPr id="4" name="Bildobjekt 29">
+            <a:extLst>
+              <a:ext uri="{FF2B5EF4-FFF2-40B4-BE49-F238E27FC236}">
+                <a16:creationId xmlns:a16="http://schemas.microsoft.com/office/drawing/2014/main" id="{28F88407-4C02-4416-9FD0-CA0580B74D86}"/>
+              </a:ext>
+            </a:extLst>
+          </p:cNvPr>
+          <p:cNvPicPr>
+            <a:picLocks noChangeAspect="1"/>
+          </p:cNvPicPr>
+          <p:nvPr/>
+        </p:nvPicPr>
+        <p:blipFill rotWithShape="1">
+          <a:blip r:embed="rId2"/>
+          <a:srcRect r="16243"/>
+          <a:stretch/>
+        </p:blipFill>
+        <p:spPr>
+          <a:xfrm>
+            <a:off x="7398326" y="1524708"/>
+            <a:ext cx="4156227" cy="1792717"/>
+          </a:xfrm>
+          <a:prstGeom prst="rect">
+            <a:avLst/>
+          </a:prstGeom>
+        </p:spPr>
+      </p:pic>
+      <p:pic>
+        <p:nvPicPr>
+          <p:cNvPr id="5" name="Bildobjekt 31">
+            <a:extLst>
+              <a:ext uri="{FF2B5EF4-FFF2-40B4-BE49-F238E27FC236}">
+                <a16:creationId xmlns:a16="http://schemas.microsoft.com/office/drawing/2014/main" id="{CB9CF4C9-03A0-4923-A382-9750A996E366}"/>
+              </a:ext>
+            </a:extLst>
+          </p:cNvPr>
+          <p:cNvPicPr>
+            <a:picLocks noChangeAspect="1"/>
+          </p:cNvPicPr>
+          <p:nvPr/>
+        </p:nvPicPr>
+        <p:blipFill rotWithShape="1">
+          <a:blip r:embed="rId3"/>
+          <a:srcRect l="1" r="4372"/>
+          <a:stretch/>
+        </p:blipFill>
+        <p:spPr>
+          <a:xfrm>
+            <a:off x="7398325" y="3447585"/>
+            <a:ext cx="4156228" cy="1662557"/>
+          </a:xfrm>
+          <a:prstGeom prst="rect">
+            <a:avLst/>
+          </a:prstGeom>
+        </p:spPr>
+      </p:pic>
     </p:spTree>
     <p:extLst>
       <p:ext uri="{BB962C8B-B14F-4D97-AF65-F5344CB8AC3E}">
@@ -3675,6 +3780,116 @@
       <p:transition/>
     </mc:Fallback>
   </mc:AlternateContent>
+  <p:timing>
+    <p:tnLst>
+      <p:par>
+        <p:cTn id="1" dur="indefinite" restart="never" nodeType="tmRoot">
+          <p:childTnLst>
+            <p:seq concurrent="1" nextAc="seek">
+              <p:cTn id="2" dur="indefinite" nodeType="mainSeq">
+                <p:childTnLst>
+                  <p:par>
+                    <p:cTn id="3" fill="hold">
+                      <p:stCondLst>
+                        <p:cond delay="indefinite"/>
+                      </p:stCondLst>
+                      <p:childTnLst>
+                        <p:par>
+                          <p:cTn id="4" fill="hold">
+                            <p:stCondLst>
+                              <p:cond delay="0"/>
+                            </p:stCondLst>
+                            <p:childTnLst>
+                              <p:par>
+                                <p:cTn id="5" presetID="63" presetClass="path" presetSubtype="0" accel="50000" decel="50000" fill="hold" nodeType="clickEffect">
+                                  <p:stCondLst>
+                                    <p:cond delay="0"/>
+                                  </p:stCondLst>
+                                  <p:childTnLst>
+                                    <p:animMotion origin="layout" path="M -3.54167E-6 7.40741E-7 L 0.43529 7.40741E-7 " pathEditMode="relative" rAng="0" ptsTypes="AA">
+                                      <p:cBhvr>
+                                        <p:cTn id="6" dur="2000" fill="hold"/>
+                                        <p:tgtEl>
+                                          <p:spTgt spid="4"/>
+                                        </p:tgtEl>
+                                        <p:attrNameLst>
+                                          <p:attrName>ppt_x</p:attrName>
+                                          <p:attrName>ppt_y</p:attrName>
+                                        </p:attrNameLst>
+                                      </p:cBhvr>
+                                      <p:rCtr x="21758" y="0"/>
+                                    </p:animMotion>
+                                  </p:childTnLst>
+                                </p:cTn>
+                              </p:par>
+                            </p:childTnLst>
+                          </p:cTn>
+                        </p:par>
+                      </p:childTnLst>
+                    </p:cTn>
+                  </p:par>
+                  <p:par>
+                    <p:cTn id="7" fill="hold">
+                      <p:stCondLst>
+                        <p:cond delay="indefinite"/>
+                      </p:stCondLst>
+                      <p:childTnLst>
+                        <p:par>
+                          <p:cTn id="8" fill="hold">
+                            <p:stCondLst>
+                              <p:cond delay="0"/>
+                            </p:stCondLst>
+                            <p:childTnLst>
+                              <p:par>
+                                <p:cTn id="9" presetID="35" presetClass="path" presetSubtype="0" accel="50000" decel="50000" fill="hold" nodeType="clickEffect">
+                                  <p:stCondLst>
+                                    <p:cond delay="0"/>
+                                  </p:stCondLst>
+                                  <p:childTnLst>
+                                    <p:animMotion origin="layout" path="M -0.15625 -2.59259E-6 L -0.45416 -2.59259E-6 " pathEditMode="relative" rAng="0" ptsTypes="AA">
+                                      <p:cBhvr>
+                                        <p:cTn id="10" dur="2000" fill="hold"/>
+                                        <p:tgtEl>
+                                          <p:spTgt spid="5"/>
+                                        </p:tgtEl>
+                                        <p:attrNameLst>
+                                          <p:attrName>ppt_x</p:attrName>
+                                          <p:attrName>ppt_y</p:attrName>
+                                        </p:attrNameLst>
+                                      </p:cBhvr>
+                                      <p:rCtr x="-14896" y="0"/>
+                                    </p:animMotion>
+                                  </p:childTnLst>
+                                </p:cTn>
+                              </p:par>
+                            </p:childTnLst>
+                          </p:cTn>
+                        </p:par>
+                      </p:childTnLst>
+                    </p:cTn>
+                  </p:par>
+                </p:childTnLst>
+              </p:cTn>
+              <p:prevCondLst>
+                <p:cond evt="onPrev" delay="0">
+                  <p:tgtEl>
+                    <p:sldTgt/>
+                  </p:tgtEl>
+                </p:cond>
+              </p:prevCondLst>
+              <p:nextCondLst>
+                <p:cond evt="onNext" delay="0">
+                  <p:tgtEl>
+                    <p:sldTgt/>
+                  </p:tgtEl>
+                </p:cond>
+              </p:nextCondLst>
+            </p:seq>
+          </p:childTnLst>
+        </p:cTn>
+      </p:par>
+    </p:tnLst>
+  </p:timing>
 </p:sld>
 </file>
 
@@ -3717,7 +3932,7 @@
                 <a:latin typeface="Segoe UI Light" panose="020B0502040204020203" pitchFamily="34" charset="0"/>
                 <a:cs typeface="Segoe UI Light" panose="020B0502040204020203" pitchFamily="34" charset="0"/>
               </a:rPr>
-              <a:t>Molnlösningen (Fredrik, Irvin)</a:t>
+              <a:t>Molnlösningen (Fredrik och Irvin)</a:t>
             </a:r>
             <a:endParaRPr lang="en-US">
               <a:latin typeface="Segoe UI Light" panose="020B0502040204020203" pitchFamily="34" charset="0"/>
@@ -3736,8 +3951,8 @@
         </p:nvSpPr>
         <p:spPr>
           <a:xfrm>
-            <a:off x="541609" y="1524708"/>
-            <a:ext cx="7652821" cy="3871518"/>
+            <a:off x="541609" y="1524707"/>
+            <a:ext cx="7652821" cy="4885237"/>
           </a:xfrm>
           <a:prstGeom prst="rect">
             <a:avLst/>
@@ -3983,7 +4198,121 @@
                 <a:cs typeface="Segoe UI" panose="020B0502040204020203" pitchFamily="34" charset="0"/>
                 <a:sym typeface="Wingdings" panose="05000000000000000000" pitchFamily="2" charset="2"/>
               </a:rPr>
-              <a:t>Azure molntjänster som användes </a:t>
+              <a:t>Azure molntjänster som användes</a:t>
+            </a:r>
+          </a:p>
+          <a:p>
+            <a:pPr lvl="1">
+              <a:lnSpc>
+                <a:spcPct val="100000"/>
+              </a:lnSpc>
+              <a:spcAft>
+                <a:spcPts val="600"/>
+              </a:spcAft>
+              <a:defRPr/>
+            </a:pPr>
+            <a:r>
+              <a:rPr lang="en-US" sz="2000">
+                <a:latin typeface="Segoe UI" panose="020B0502040204020203" pitchFamily="34" charset="0"/>
+                <a:cs typeface="Segoe UI" panose="020B0502040204020203" pitchFamily="34" charset="0"/>
+                <a:sym typeface="Wingdings" panose="05000000000000000000" pitchFamily="2" charset="2"/>
+              </a:rPr>
+              <a:t>Azure SQL Server </a:t>
+            </a:r>
+          </a:p>
+          <a:p>
+            <a:pPr lvl="1">
+              <a:lnSpc>
+                <a:spcPct val="100000"/>
+              </a:lnSpc>
+              <a:spcAft>
+                <a:spcPts val="600"/>
+              </a:spcAft>
+              <a:defRPr/>
+            </a:pPr>
+            <a:r>
+              <a:rPr lang="en-US" sz="2000">
+                <a:latin typeface="Segoe UI" panose="020B0502040204020203" pitchFamily="34" charset="0"/>
+                <a:cs typeface="Segoe UI" panose="020B0502040204020203" pitchFamily="34" charset="0"/>
+                <a:sym typeface="Wingdings" panose="05000000000000000000" pitchFamily="2" charset="2"/>
+              </a:rPr>
+              <a:t>Azure SQL Database </a:t>
+            </a:r>
+          </a:p>
+          <a:p>
+            <a:pPr lvl="1">
+              <a:lnSpc>
+                <a:spcPct val="100000"/>
+              </a:lnSpc>
+              <a:spcAft>
+                <a:spcPts val="600"/>
+              </a:spcAft>
+              <a:defRPr/>
+            </a:pPr>
+            <a:r>
+              <a:rPr lang="en-US" sz="2000">
+                <a:latin typeface="Segoe UI" panose="020B0502040204020203" pitchFamily="34" charset="0"/>
+                <a:cs typeface="Segoe UI" panose="020B0502040204020203" pitchFamily="34" charset="0"/>
+                <a:sym typeface="Wingdings" panose="05000000000000000000" pitchFamily="2" charset="2"/>
+              </a:rPr>
+              <a:t>Azure Container Instance </a:t>
+            </a:r>
+          </a:p>
+          <a:p>
+            <a:pPr lvl="1">
+              <a:lnSpc>
+                <a:spcPct val="100000"/>
+              </a:lnSpc>
+              <a:spcAft>
+                <a:spcPts val="600"/>
+              </a:spcAft>
+              <a:defRPr/>
+            </a:pPr>
+            <a:r>
+              <a:rPr lang="en-US" sz="2000">
+                <a:latin typeface="Segoe UI" panose="020B0502040204020203" pitchFamily="34" charset="0"/>
+                <a:cs typeface="Segoe UI" panose="020B0502040204020203" pitchFamily="34" charset="0"/>
+                <a:sym typeface="Wingdings" panose="05000000000000000000" pitchFamily="2" charset="2"/>
+              </a:rPr>
+              <a:t>Azure Container Registry</a:t>
+            </a:r>
+          </a:p>
+          <a:p>
+            <a:pPr lvl="1">
+              <a:lnSpc>
+                <a:spcPct val="100000"/>
+              </a:lnSpc>
+              <a:spcAft>
+                <a:spcPts val="600"/>
+              </a:spcAft>
+              <a:defRPr/>
+            </a:pPr>
+            <a:r>
+              <a:rPr lang="en-US" sz="2000">
+                <a:latin typeface="Segoe UI" panose="020B0502040204020203" pitchFamily="34" charset="0"/>
+                <a:cs typeface="Segoe UI" panose="020B0502040204020203" pitchFamily="34" charset="0"/>
+                <a:sym typeface="Wingdings" panose="05000000000000000000" pitchFamily="2" charset="2"/>
+              </a:rPr>
+              <a:t>Azure Key Vault</a:t>
+            </a:r>
+          </a:p>
+          <a:p>
+            <a:pPr lvl="1">
+              <a:lnSpc>
+                <a:spcPct val="100000"/>
+              </a:lnSpc>
+              <a:spcAft>
+                <a:spcPts val="600"/>
+              </a:spcAft>
+              <a:defRPr/>
+            </a:pPr>
+            <a:r>
+              <a:rPr lang="en-US" sz="2000">
+                <a:latin typeface="Segoe UI" panose="020B0502040204020203" pitchFamily="34" charset="0"/>
+                <a:cs typeface="Segoe UI" panose="020B0502040204020203" pitchFamily="34" charset="0"/>
+                <a:sym typeface="Wingdings" panose="05000000000000000000" pitchFamily="2" charset="2"/>
+              </a:rPr>
+              <a:t>Azure Application Insights </a:t>
             </a:r>
             <a:endParaRPr lang="en-US" sz="2000">
               <a:latin typeface="Segoe UI" panose="020B0502040204020203" pitchFamily="34" charset="0"/>
@@ -6248,6 +6577,24 @@
 </file>
 
 <file path=customXml/item1.xml><?xml version="1.0" encoding="utf-8"?>
+<?mso-contentType ?>
+<FormTemplates xmlns="http://schemas.microsoft.com/sharepoint/v3/contenttype/forms">
+  <Display>DocumentLibraryForm</Display>
+  <Edit>DocumentLibraryForm</Edit>
+  <New>DocumentLibraryForm</New>
+</FormTemplates>
+</file>
+
+<file path=customXml/item2.xml><?xml version="1.0" encoding="utf-8"?>
+<p:properties xmlns:p="http://schemas.microsoft.com/office/2006/metadata/properties" xmlns:xsi="http://www.w3.org/2001/XMLSchema-instance" xmlns:pc="http://schemas.microsoft.com/office/infopath/2007/PartnerControls">
+  <documentManagement>
+    <Status xmlns="71af3243-3dd4-4a8d-8c0d-dd76da1f02a5">Not started</Status>
+    <MediaServiceKeyPoints xmlns="71af3243-3dd4-4a8d-8c0d-dd76da1f02a5" xsi:nil="true"/>
+  </documentManagement>
+</p:properties>
+</file>
+
+<file path=customXml/item3.xml><?xml version="1.0" encoding="utf-8"?>
 <ct:contentTypeSchema xmlns:ct="http://schemas.microsoft.com/office/2006/metadata/contentType" xmlns:ma="http://schemas.microsoft.com/office/2006/metadata/properties/metaAttributes" ct:_="" ma:_="" ma:contentTypeName="Document" ma:contentTypeID="0x01010079F111ED35F8CC479449609E8A0923A6" ma:contentTypeVersion="12" ma:contentTypeDescription="Create a new document." ma:contentTypeScope="" ma:versionID="a8a52e8c320b9a064ae3583ae3861c92">
   <xsd:schema xmlns:xsd="http://www.w3.org/2001/XMLSchema" xmlns:xs="http://www.w3.org/2001/XMLSchema" xmlns:p="http://schemas.microsoft.com/office/2006/metadata/properties" xmlns:ns2="71af3243-3dd4-4a8d-8c0d-dd76da1f02a5" xmlns:ns3="16c05727-aa75-4e4a-9b5f-8a80a1165891" targetNamespace="http://schemas.microsoft.com/office/2006/metadata/properties" ma:root="true" ma:fieldsID="88020cb39231a0945110f9cd888b521a" ns2:_="" ns3:_="">
     <xsd:import namespace="71af3243-3dd4-4a8d-8c0d-dd76da1f02a5"/>
@@ -6468,25 +6815,32 @@
 </ct:contentTypeSchema>
 </file>
 
-<file path=customXml/item2.xml><?xml version="1.0" encoding="utf-8"?>
-<p:properties xmlns:p="http://schemas.microsoft.com/office/2006/metadata/properties" xmlns:xsi="http://www.w3.org/2001/XMLSchema-instance" xmlns:pc="http://schemas.microsoft.com/office/infopath/2007/PartnerControls">
-  <documentManagement>
-    <Status xmlns="71af3243-3dd4-4a8d-8c0d-dd76da1f02a5">Not started</Status>
-    <MediaServiceKeyPoints xmlns="71af3243-3dd4-4a8d-8c0d-dd76da1f02a5" xsi:nil="true"/>
-  </documentManagement>
-</p:properties>
+<file path=customXml/itemProps1.xml><?xml version="1.0" encoding="utf-8"?>
+<ds:datastoreItem xmlns:ds="http://schemas.openxmlformats.org/officeDocument/2006/customXml" ds:itemID="{7EE8C63A-4744-4DE4-BB49-0FF0B5375C60}">
+  <ds:schemaRefs>
+    <ds:schemaRef ds:uri="http://schemas.microsoft.com/sharepoint/v3/contenttype/forms"/>
+  </ds:schemaRefs>
+</ds:datastoreItem>
 </file>
 
-<file path=customXml/item3.xml><?xml version="1.0" encoding="utf-8"?>
-<?mso-contentType ?>
-<FormTemplates xmlns="http://schemas.microsoft.com/sharepoint/v3/contenttype/forms">
-  <Display>DocumentLibraryForm</Display>
-  <Edit>DocumentLibraryForm</Edit>
-  <New>DocumentLibraryForm</New>
-</FormTemplates>
+<file path=customXml/itemProps2.xml><?xml version="1.0" encoding="utf-8"?>
+<ds:datastoreItem xmlns:ds="http://schemas.openxmlformats.org/officeDocument/2006/customXml" ds:itemID="{950072C5-DDE0-4258-BA7A-4D4B80DFA632}">
+  <ds:schemaRefs>
+    <ds:schemaRef ds:uri="http://purl.org/dc/terms/"/>
+    <ds:schemaRef ds:uri="http://schemas.openxmlformats.org/package/2006/metadata/core-properties"/>
+    <ds:schemaRef ds:uri="16c05727-aa75-4e4a-9b5f-8a80a1165891"/>
+    <ds:schemaRef ds:uri="http://purl.org/dc/dcmitype/"/>
+    <ds:schemaRef ds:uri="http://schemas.microsoft.com/office/2006/documentManagement/types"/>
+    <ds:schemaRef ds:uri="http://purl.org/dc/elements/1.1/"/>
+    <ds:schemaRef ds:uri="http://schemas.microsoft.com/office/2006/metadata/properties"/>
+    <ds:schemaRef ds:uri="http://schemas.microsoft.com/office/infopath/2007/PartnerControls"/>
+    <ds:schemaRef ds:uri="71af3243-3dd4-4a8d-8c0d-dd76da1f02a5"/>
+    <ds:schemaRef ds:uri="http://www.w3.org/XML/1998/namespace"/>
+  </ds:schemaRefs>
+</ds:datastoreItem>
 </file>
 
-<file path=customXml/itemProps1.xml><?xml version="1.0" encoding="utf-8"?>
+<file path=customXml/itemProps3.xml><?xml version="1.0" encoding="utf-8"?>
 <ds:datastoreItem xmlns:ds="http://schemas.openxmlformats.org/officeDocument/2006/customXml" ds:itemID="{FD7FC771-7DFE-49DA-B577-71181BFBCB2E}">
   <ds:schemaRefs>
     <ds:schemaRef ds:uri="http://schemas.microsoft.com/office/2006/metadata/contentType"/>
@@ -6503,22 +6857,4 @@
     <ds:schemaRef ds:uri="http://schemas.microsoft.com/internal/obd"/>
   </ds:schemaRefs>
 </ds:datastoreItem>
-</file>
-
-<file path=customXml/itemProps2.xml><?xml version="1.0" encoding="utf-8"?>
-<ds:datastoreItem xmlns:ds="http://schemas.openxmlformats.org/officeDocument/2006/customXml" ds:itemID="{950072C5-DDE0-4258-BA7A-4D4B80DFA632}">
-  <ds:schemaRefs>
-    <ds:schemaRef ds:uri="http://schemas.microsoft.com/office/2006/metadata/properties"/>
-    <ds:schemaRef ds:uri="http://schemas.microsoft.com/office/infopath/2007/PartnerControls"/>
-    <ds:schemaRef ds:uri="71af3243-3dd4-4a8d-8c0d-dd76da1f02a5"/>
-  </ds:schemaRefs>
-</ds:datastoreItem>
-</file>
-
-<file path=customXml/itemProps3.xml><?xml version="1.0" encoding="utf-8"?>
-<ds:datastoreItem xmlns:ds="http://schemas.openxmlformats.org/officeDocument/2006/customXml" ds:itemID="{7EE8C63A-4744-4DE4-BB49-0FF0B5375C60}">
-  <ds:schemaRefs>
-    <ds:schemaRef ds:uri="http://schemas.microsoft.com/sharepoint/v3/contenttype/forms"/>
-  </ds:schemaRefs>
-</ds:datastoreItem>
 </file>
</xml_diff>